<commit_message>
First shot at getting the arrow into the bio section. Used an svg img that will have to be updated for the correct font or redone using CSS.
</commit_message>
<xml_diff>
--- a/misc/Toni portfolio draft.pptx
+++ b/misc/Toni portfolio draft.pptx
@@ -104,6 +104,22 @@
       </a:defRPr>
     </a:lvl9pPr>
   </p:defaultTextStyle>
+  <p:extLst>
+    <p:ext uri="{EFAFB233-063F-42B5-8137-9DF3F51BA10A}">
+      <p15:sldGuideLst xmlns:p15="http://schemas.microsoft.com/office/powerpoint/2012/main">
+        <p15:guide id="1" orient="horz" pos="8640">
+          <p15:clr>
+            <a:srgbClr val="A4A3A4"/>
+          </p15:clr>
+        </p15:guide>
+        <p15:guide id="2" pos="4032">
+          <p15:clr>
+            <a:srgbClr val="A4A3A4"/>
+          </p15:clr>
+        </p15:guide>
+      </p15:sldGuideLst>
+    </p:ext>
+  </p:extLst>
 </p:presentation>
 </file>
 
@@ -288,7 +304,7 @@
           <a:p>
             <a:fld id="{4AEB9218-1CEC-4961-A0D0-D1D4A6D6428D}" type="datetimeFigureOut">
               <a:rPr lang="en-US" smtClean="0"/>
-              <a:t>8/26/2015</a:t>
+              <a:t>9/30/15</a:t>
             </a:fld>
             <a:endParaRPr lang="en-US"/>
           </a:p>
@@ -458,7 +474,7 @@
           <a:p>
             <a:fld id="{4AEB9218-1CEC-4961-A0D0-D1D4A6D6428D}" type="datetimeFigureOut">
               <a:rPr lang="en-US" smtClean="0"/>
-              <a:t>8/26/2015</a:t>
+              <a:t>9/30/15</a:t>
             </a:fld>
             <a:endParaRPr lang="en-US"/>
           </a:p>
@@ -638,7 +654,7 @@
           <a:p>
             <a:fld id="{4AEB9218-1CEC-4961-A0D0-D1D4A6D6428D}" type="datetimeFigureOut">
               <a:rPr lang="en-US" smtClean="0"/>
-              <a:t>8/26/2015</a:t>
+              <a:t>9/30/15</a:t>
             </a:fld>
             <a:endParaRPr lang="en-US"/>
           </a:p>
@@ -808,7 +824,7 @@
           <a:p>
             <a:fld id="{4AEB9218-1CEC-4961-A0D0-D1D4A6D6428D}" type="datetimeFigureOut">
               <a:rPr lang="en-US" smtClean="0"/>
-              <a:t>8/26/2015</a:t>
+              <a:t>9/30/15</a:t>
             </a:fld>
             <a:endParaRPr lang="en-US"/>
           </a:p>
@@ -1054,7 +1070,7 @@
           <a:p>
             <a:fld id="{4AEB9218-1CEC-4961-A0D0-D1D4A6D6428D}" type="datetimeFigureOut">
               <a:rPr lang="en-US" smtClean="0"/>
-              <a:t>8/26/2015</a:t>
+              <a:t>9/30/15</a:t>
             </a:fld>
             <a:endParaRPr lang="en-US"/>
           </a:p>
@@ -1342,7 +1358,7 @@
           <a:p>
             <a:fld id="{4AEB9218-1CEC-4961-A0D0-D1D4A6D6428D}" type="datetimeFigureOut">
               <a:rPr lang="en-US" smtClean="0"/>
-              <a:t>8/26/2015</a:t>
+              <a:t>9/30/15</a:t>
             </a:fld>
             <a:endParaRPr lang="en-US"/>
           </a:p>
@@ -1769,7 +1785,7 @@
           <a:p>
             <a:fld id="{4AEB9218-1CEC-4961-A0D0-D1D4A6D6428D}" type="datetimeFigureOut">
               <a:rPr lang="en-US" smtClean="0"/>
-              <a:t>8/26/2015</a:t>
+              <a:t>9/30/15</a:t>
             </a:fld>
             <a:endParaRPr lang="en-US"/>
           </a:p>
@@ -1887,7 +1903,7 @@
           <a:p>
             <a:fld id="{4AEB9218-1CEC-4961-A0D0-D1D4A6D6428D}" type="datetimeFigureOut">
               <a:rPr lang="en-US" smtClean="0"/>
-              <a:t>8/26/2015</a:t>
+              <a:t>9/30/15</a:t>
             </a:fld>
             <a:endParaRPr lang="en-US"/>
           </a:p>
@@ -1982,7 +1998,7 @@
           <a:p>
             <a:fld id="{4AEB9218-1CEC-4961-A0D0-D1D4A6D6428D}" type="datetimeFigureOut">
               <a:rPr lang="en-US" smtClean="0"/>
-              <a:t>8/26/2015</a:t>
+              <a:t>9/30/15</a:t>
             </a:fld>
             <a:endParaRPr lang="en-US"/>
           </a:p>
@@ -2259,7 +2275,7 @@
           <a:p>
             <a:fld id="{4AEB9218-1CEC-4961-A0D0-D1D4A6D6428D}" type="datetimeFigureOut">
               <a:rPr lang="en-US" smtClean="0"/>
-              <a:t>8/26/2015</a:t>
+              <a:t>9/30/15</a:t>
             </a:fld>
             <a:endParaRPr lang="en-US"/>
           </a:p>
@@ -2512,7 +2528,7 @@
           <a:p>
             <a:fld id="{4AEB9218-1CEC-4961-A0D0-D1D4A6D6428D}" type="datetimeFigureOut">
               <a:rPr lang="en-US" smtClean="0"/>
-              <a:t>8/26/2015</a:t>
+              <a:t>9/30/15</a:t>
             </a:fld>
             <a:endParaRPr lang="en-US"/>
           </a:p>
@@ -2725,7 +2741,7 @@
           <a:p>
             <a:fld id="{4AEB9218-1CEC-4961-A0D0-D1D4A6D6428D}" type="datetimeFigureOut">
               <a:rPr lang="en-US" smtClean="0"/>
-              <a:t>8/26/2015</a:t>
+              <a:t>9/30/15</a:t>
             </a:fld>
             <a:endParaRPr lang="en-US"/>
           </a:p>
@@ -3156,7 +3172,7 @@
         </p:nvSpPr>
         <p:spPr>
           <a:xfrm>
-            <a:off x="0" y="5486400"/>
+            <a:off x="-23493" y="5436518"/>
             <a:ext cx="12801600" cy="21945600"/>
           </a:xfrm>
           <a:prstGeom prst="rect">
@@ -4252,7 +4268,6 @@
               <a:rPr lang="en-US" dirty="0"/>
               <a:t>4</a:t>
             </a:r>
-            <a:endParaRPr lang="en-US" dirty="0"/>
           </a:p>
         </p:txBody>
       </p:sp>
@@ -4296,7 +4311,6 @@
               <a:rPr lang="en-US" dirty="0"/>
               <a:t>5</a:t>
             </a:r>
-            <a:endParaRPr lang="en-US" dirty="0"/>
           </a:p>
         </p:txBody>
       </p:sp>
@@ -4340,7 +4354,6 @@
               <a:rPr lang="en-US" dirty="0"/>
               <a:t>6</a:t>
             </a:r>
-            <a:endParaRPr lang="en-US" dirty="0"/>
           </a:p>
         </p:txBody>
       </p:sp>
@@ -4382,6 +4395,328 @@
               </a:solidFill>
               <a:latin typeface="French Script MT" panose="03020402040607040605" pitchFamily="66" charset="0"/>
             </a:endParaRPr>
+          </a:p>
+        </p:txBody>
+      </p:sp>
+      <p:sp>
+        <p:nvSpPr>
+          <p:cNvPr id="3" name="Rectangle 2"/>
+          <p:cNvSpPr/>
+          <p:nvPr/>
+        </p:nvSpPr>
+        <p:spPr>
+          <a:xfrm>
+            <a:off x="207014" y="6300118"/>
+            <a:ext cx="12340586" cy="4228182"/>
+          </a:xfrm>
+          <a:prstGeom prst="rect">
+            <a:avLst/>
+          </a:prstGeom>
+          <a:noFill/>
+          <a:ln>
+            <a:solidFill>
+              <a:srgbClr val="FF0000"/>
+            </a:solidFill>
+          </a:ln>
+        </p:spPr>
+        <p:style>
+          <a:lnRef idx="2">
+            <a:schemeClr val="accent1">
+              <a:shade val="50000"/>
+            </a:schemeClr>
+          </a:lnRef>
+          <a:fillRef idx="1">
+            <a:schemeClr val="accent1"/>
+          </a:fillRef>
+          <a:effectRef idx="0">
+            <a:schemeClr val="accent1"/>
+          </a:effectRef>
+          <a:fontRef idx="minor">
+            <a:schemeClr val="lt1"/>
+          </a:fontRef>
+        </p:style>
+        <p:txBody>
+          <a:bodyPr rtlCol="0" anchor="ctr"/>
+          <a:lstStyle/>
+          <a:p>
+            <a:pPr algn="ctr"/>
+            <a:endParaRPr lang="en-US"/>
+          </a:p>
+        </p:txBody>
+      </p:sp>
+      <p:sp>
+        <p:nvSpPr>
+          <p:cNvPr id="40" name="Rectangle 39"/>
+          <p:cNvSpPr/>
+          <p:nvPr/>
+        </p:nvSpPr>
+        <p:spPr>
+          <a:xfrm>
+            <a:off x="308615" y="6401719"/>
+            <a:ext cx="12340586" cy="630958"/>
+          </a:xfrm>
+          <a:prstGeom prst="rect">
+            <a:avLst/>
+          </a:prstGeom>
+          <a:noFill/>
+          <a:ln>
+            <a:solidFill>
+              <a:srgbClr val="FF0000"/>
+            </a:solidFill>
+          </a:ln>
+        </p:spPr>
+        <p:style>
+          <a:lnRef idx="2">
+            <a:schemeClr val="accent1">
+              <a:shade val="50000"/>
+            </a:schemeClr>
+          </a:lnRef>
+          <a:fillRef idx="1">
+            <a:schemeClr val="accent1"/>
+          </a:fillRef>
+          <a:effectRef idx="0">
+            <a:schemeClr val="accent1"/>
+          </a:effectRef>
+          <a:fontRef idx="minor">
+            <a:schemeClr val="lt1"/>
+          </a:fontRef>
+        </p:style>
+        <p:txBody>
+          <a:bodyPr rtlCol="0" anchor="ctr"/>
+          <a:lstStyle/>
+          <a:p>
+            <a:pPr algn="ctr"/>
+            <a:endParaRPr lang="en-US"/>
+          </a:p>
+        </p:txBody>
+      </p:sp>
+      <p:sp>
+        <p:nvSpPr>
+          <p:cNvPr id="41" name="Rectangle 40"/>
+          <p:cNvSpPr/>
+          <p:nvPr/>
+        </p:nvSpPr>
+        <p:spPr>
+          <a:xfrm>
+            <a:off x="292930" y="7111698"/>
+            <a:ext cx="12340586" cy="3241897"/>
+          </a:xfrm>
+          <a:prstGeom prst="rect">
+            <a:avLst/>
+          </a:prstGeom>
+          <a:noFill/>
+          <a:ln>
+            <a:solidFill>
+              <a:srgbClr val="FF0000"/>
+            </a:solidFill>
+          </a:ln>
+        </p:spPr>
+        <p:style>
+          <a:lnRef idx="2">
+            <a:schemeClr val="accent1">
+              <a:shade val="50000"/>
+            </a:schemeClr>
+          </a:lnRef>
+          <a:fillRef idx="1">
+            <a:schemeClr val="accent1"/>
+          </a:fillRef>
+          <a:effectRef idx="0">
+            <a:schemeClr val="accent1"/>
+          </a:effectRef>
+          <a:fontRef idx="minor">
+            <a:schemeClr val="lt1"/>
+          </a:fontRef>
+        </p:style>
+        <p:txBody>
+          <a:bodyPr rtlCol="0" anchor="ctr"/>
+          <a:lstStyle/>
+          <a:p>
+            <a:pPr algn="ctr"/>
+            <a:endParaRPr lang="en-US"/>
+          </a:p>
+        </p:txBody>
+      </p:sp>
+      <p:sp>
+        <p:nvSpPr>
+          <p:cNvPr id="42" name="Rectangle 41"/>
+          <p:cNvSpPr/>
+          <p:nvPr/>
+        </p:nvSpPr>
+        <p:spPr>
+          <a:xfrm>
+            <a:off x="7432484" y="7228742"/>
+            <a:ext cx="4907378" cy="2854804"/>
+          </a:xfrm>
+          <a:prstGeom prst="rect">
+            <a:avLst/>
+          </a:prstGeom>
+          <a:noFill/>
+          <a:ln>
+            <a:solidFill>
+              <a:srgbClr val="FF0000"/>
+            </a:solidFill>
+          </a:ln>
+        </p:spPr>
+        <p:style>
+          <a:lnRef idx="2">
+            <a:schemeClr val="accent1">
+              <a:shade val="50000"/>
+            </a:schemeClr>
+          </a:lnRef>
+          <a:fillRef idx="1">
+            <a:schemeClr val="accent1"/>
+          </a:fillRef>
+          <a:effectRef idx="0">
+            <a:schemeClr val="accent1"/>
+          </a:effectRef>
+          <a:fontRef idx="minor">
+            <a:schemeClr val="lt1"/>
+          </a:fontRef>
+        </p:style>
+        <p:txBody>
+          <a:bodyPr rtlCol="0" anchor="ctr"/>
+          <a:lstStyle/>
+          <a:p>
+            <a:pPr algn="ctr"/>
+            <a:endParaRPr lang="en-US"/>
+          </a:p>
+        </p:txBody>
+      </p:sp>
+      <p:sp>
+        <p:nvSpPr>
+          <p:cNvPr id="43" name="Rectangle 42"/>
+          <p:cNvSpPr/>
+          <p:nvPr/>
+        </p:nvSpPr>
+        <p:spPr>
+          <a:xfrm>
+            <a:off x="485451" y="7260897"/>
+            <a:ext cx="6716525" cy="2854804"/>
+          </a:xfrm>
+          <a:prstGeom prst="rect">
+            <a:avLst/>
+          </a:prstGeom>
+          <a:noFill/>
+          <a:ln>
+            <a:solidFill>
+              <a:srgbClr val="FF0000"/>
+            </a:solidFill>
+          </a:ln>
+        </p:spPr>
+        <p:style>
+          <a:lnRef idx="2">
+            <a:schemeClr val="accent1">
+              <a:shade val="50000"/>
+            </a:schemeClr>
+          </a:lnRef>
+          <a:fillRef idx="1">
+            <a:schemeClr val="accent1"/>
+          </a:fillRef>
+          <a:effectRef idx="0">
+            <a:schemeClr val="accent1"/>
+          </a:effectRef>
+          <a:fontRef idx="minor">
+            <a:schemeClr val="lt1"/>
+          </a:fontRef>
+        </p:style>
+        <p:txBody>
+          <a:bodyPr rtlCol="0" anchor="ctr"/>
+          <a:lstStyle/>
+          <a:p>
+            <a:pPr algn="ctr"/>
+            <a:endParaRPr lang="en-US"/>
+          </a:p>
+        </p:txBody>
+      </p:sp>
+      <p:sp>
+        <p:nvSpPr>
+          <p:cNvPr id="44" name="Rectangle 43"/>
+          <p:cNvSpPr/>
+          <p:nvPr/>
+        </p:nvSpPr>
+        <p:spPr>
+          <a:xfrm>
+            <a:off x="637851" y="7370330"/>
+            <a:ext cx="6220149" cy="1630871"/>
+          </a:xfrm>
+          <a:prstGeom prst="rect">
+            <a:avLst/>
+          </a:prstGeom>
+          <a:noFill/>
+          <a:ln>
+            <a:solidFill>
+              <a:srgbClr val="FF0000"/>
+            </a:solidFill>
+          </a:ln>
+        </p:spPr>
+        <p:style>
+          <a:lnRef idx="2">
+            <a:schemeClr val="accent1">
+              <a:shade val="50000"/>
+            </a:schemeClr>
+          </a:lnRef>
+          <a:fillRef idx="1">
+            <a:schemeClr val="accent1"/>
+          </a:fillRef>
+          <a:effectRef idx="0">
+            <a:schemeClr val="accent1"/>
+          </a:effectRef>
+          <a:fontRef idx="minor">
+            <a:schemeClr val="lt1"/>
+          </a:fontRef>
+        </p:style>
+        <p:txBody>
+          <a:bodyPr rtlCol="0" anchor="ctr"/>
+          <a:lstStyle/>
+          <a:p>
+            <a:pPr algn="ctr"/>
+            <a:endParaRPr lang="en-US"/>
+          </a:p>
+        </p:txBody>
+      </p:sp>
+      <p:sp>
+        <p:nvSpPr>
+          <p:cNvPr id="45" name="Rectangle 44"/>
+          <p:cNvSpPr/>
+          <p:nvPr/>
+        </p:nvSpPr>
+        <p:spPr>
+          <a:xfrm>
+            <a:off x="637851" y="9046629"/>
+            <a:ext cx="6220149" cy="907928"/>
+          </a:xfrm>
+          <a:prstGeom prst="rect">
+            <a:avLst/>
+          </a:prstGeom>
+          <a:noFill/>
+          <a:ln>
+            <a:solidFill>
+              <a:srgbClr val="FF0000"/>
+            </a:solidFill>
+          </a:ln>
+        </p:spPr>
+        <p:style>
+          <a:lnRef idx="2">
+            <a:schemeClr val="accent1">
+              <a:shade val="50000"/>
+            </a:schemeClr>
+          </a:lnRef>
+          <a:fillRef idx="1">
+            <a:schemeClr val="accent1"/>
+          </a:fillRef>
+          <a:effectRef idx="0">
+            <a:schemeClr val="accent1"/>
+          </a:effectRef>
+          <a:fontRef idx="minor">
+            <a:schemeClr val="lt1"/>
+          </a:fontRef>
+        </p:style>
+        <p:txBody>
+          <a:bodyPr rtlCol="0" anchor="ctr"/>
+          <a:lstStyle/>
+          <a:p>
+            <a:pPr algn="ctr"/>
+            <a:endParaRPr lang="en-US"/>
           </a:p>
         </p:txBody>
       </p:sp>

</xml_diff>